<commit_message>
Trop envie d'étrangler le prof de mobop
</commit_message>
<xml_diff>
--- a/presentation/presentation.pptx
+++ b/presentation/presentation.pptx
@@ -5,21 +5,22 @@
     <p:sldMasterId id="2147483648" r:id="rId1"/>
   </p:sldMasterIdLst>
   <p:notesMasterIdLst>
-    <p:notesMasterId r:id="rId11"/>
+    <p:notesMasterId r:id="rId12"/>
   </p:notesMasterIdLst>
   <p:handoutMasterIdLst>
-    <p:handoutMasterId r:id="rId12"/>
+    <p:handoutMasterId r:id="rId13"/>
   </p:handoutMasterIdLst>
   <p:sldIdLst>
     <p:sldId id="259" r:id="rId2"/>
     <p:sldId id="260" r:id="rId3"/>
     <p:sldId id="267" r:id="rId4"/>
     <p:sldId id="268" r:id="rId5"/>
-    <p:sldId id="269" r:id="rId6"/>
-    <p:sldId id="270" r:id="rId7"/>
-    <p:sldId id="271" r:id="rId8"/>
-    <p:sldId id="272" r:id="rId9"/>
-    <p:sldId id="266" r:id="rId10"/>
+    <p:sldId id="273" r:id="rId6"/>
+    <p:sldId id="269" r:id="rId7"/>
+    <p:sldId id="270" r:id="rId8"/>
+    <p:sldId id="271" r:id="rId9"/>
+    <p:sldId id="272" r:id="rId10"/>
+    <p:sldId id="266" r:id="rId11"/>
   </p:sldIdLst>
   <p:sldSz cx="10693400" cy="7561263"/>
   <p:notesSz cx="7099300" cy="10234613"/>
@@ -907,6 +908,96 @@
 </p:notes>
 </file>
 
+<file path=ppt/notesSlides/notesSlide10.xml><?xml version="1.0" encoding="utf-8"?>
+<p:notes xmlns:a="http://schemas.openxmlformats.org/drawingml/2006/main" xmlns:r="http://schemas.openxmlformats.org/officeDocument/2006/relationships" xmlns:p="http://schemas.openxmlformats.org/presentationml/2006/main">
+  <p:cSld>
+    <p:spTree>
+      <p:nvGrpSpPr>
+        <p:cNvPr id="1" name=""/>
+        <p:cNvGrpSpPr/>
+        <p:nvPr/>
+      </p:nvGrpSpPr>
+      <p:grpSpPr>
+        <a:xfrm>
+          <a:off x="0" y="0"/>
+          <a:ext cx="0" cy="0"/>
+          <a:chOff x="0" y="0"/>
+          <a:chExt cx="0" cy="0"/>
+        </a:xfrm>
+      </p:grpSpPr>
+      <p:sp>
+        <p:nvSpPr>
+          <p:cNvPr id="2" name="Espace réservé de l'image des diapositives 1"/>
+          <p:cNvSpPr>
+            <a:spLocks noGrp="1" noRot="1" noChangeAspect="1"/>
+          </p:cNvSpPr>
+          <p:nvPr>
+            <p:ph type="sldImg"/>
+          </p:nvPr>
+        </p:nvSpPr>
+        <p:spPr/>
+      </p:sp>
+      <p:sp>
+        <p:nvSpPr>
+          <p:cNvPr id="3" name="Espace réservé des commentaires 2"/>
+          <p:cNvSpPr>
+            <a:spLocks noGrp="1"/>
+          </p:cNvSpPr>
+          <p:nvPr>
+            <p:ph type="body" idx="1"/>
+          </p:nvPr>
+        </p:nvSpPr>
+        <p:spPr/>
+        <p:txBody>
+          <a:bodyPr/>
+          <a:lstStyle/>
+          <a:p>
+            <a:endParaRPr lang="fr-CH" baseline="0" dirty="0" smtClean="0"/>
+          </a:p>
+        </p:txBody>
+      </p:sp>
+      <p:sp>
+        <p:nvSpPr>
+          <p:cNvPr id="4" name="Espace réservé du numéro de diapositive 3"/>
+          <p:cNvSpPr>
+            <a:spLocks noGrp="1"/>
+          </p:cNvSpPr>
+          <p:nvPr>
+            <p:ph type="sldNum" sz="quarter" idx="10"/>
+          </p:nvPr>
+        </p:nvSpPr>
+        <p:spPr/>
+        <p:txBody>
+          <a:bodyPr/>
+          <a:lstStyle/>
+          <a:p>
+            <a:pPr>
+              <a:defRPr/>
+            </a:pPr>
+            <a:fld id="{8A0D9D49-535A-4991-867C-A89CB2AA2E0E}" type="slidenum">
+              <a:rPr lang="fr-CH" smtClean="0"/>
+              <a:pPr>
+                <a:defRPr/>
+              </a:pPr>
+              <a:t>10</a:t>
+            </a:fld>
+            <a:endParaRPr lang="fr-CH"/>
+          </a:p>
+        </p:txBody>
+      </p:sp>
+    </p:spTree>
+    <p:extLst>
+      <p:ext uri="{BB962C8B-B14F-4D97-AF65-F5344CB8AC3E}">
+        <p14:creationId xmlns:p14="http://schemas.microsoft.com/office/powerpoint/2010/main" val="3521726753"/>
+      </p:ext>
+    </p:extLst>
+  </p:cSld>
+  <p:clrMapOvr>
+    <a:masterClrMapping/>
+  </p:clrMapOvr>
+</p:notes>
+</file>
+
 <file path=ppt/notesSlides/notesSlide2.xml><?xml version="1.0" encoding="utf-8"?>
 <p:notes xmlns:a="http://schemas.openxmlformats.org/drawingml/2006/main" xmlns:r="http://schemas.openxmlformats.org/officeDocument/2006/relationships" xmlns:p="http://schemas.openxmlformats.org/presentationml/2006/main">
   <p:cSld>
@@ -1257,7 +1348,7 @@
     </p:spTree>
     <p:extLst>
       <p:ext uri="{BB962C8B-B14F-4D97-AF65-F5344CB8AC3E}">
-        <p14:creationId xmlns:p14="http://schemas.microsoft.com/office/powerpoint/2010/main" val="2474835902"/>
+        <p14:creationId xmlns:p14="http://schemas.microsoft.com/office/powerpoint/2010/main" val="1940599577"/>
       </p:ext>
     </p:extLst>
   </p:cSld>
@@ -1347,7 +1438,7 @@
     </p:spTree>
     <p:extLst>
       <p:ext uri="{BB962C8B-B14F-4D97-AF65-F5344CB8AC3E}">
-        <p14:creationId xmlns:p14="http://schemas.microsoft.com/office/powerpoint/2010/main" val="1250629760"/>
+        <p14:creationId xmlns:p14="http://schemas.microsoft.com/office/powerpoint/2010/main" val="2474835902"/>
       </p:ext>
     </p:extLst>
   </p:cSld>
@@ -1437,7 +1528,7 @@
     </p:spTree>
     <p:extLst>
       <p:ext uri="{BB962C8B-B14F-4D97-AF65-F5344CB8AC3E}">
-        <p14:creationId xmlns:p14="http://schemas.microsoft.com/office/powerpoint/2010/main" val="1289883719"/>
+        <p14:creationId xmlns:p14="http://schemas.microsoft.com/office/powerpoint/2010/main" val="1250629760"/>
       </p:ext>
     </p:extLst>
   </p:cSld>
@@ -1527,7 +1618,7 @@
     </p:spTree>
     <p:extLst>
       <p:ext uri="{BB962C8B-B14F-4D97-AF65-F5344CB8AC3E}">
-        <p14:creationId xmlns:p14="http://schemas.microsoft.com/office/powerpoint/2010/main" val="1413486313"/>
+        <p14:creationId xmlns:p14="http://schemas.microsoft.com/office/powerpoint/2010/main" val="1289883719"/>
       </p:ext>
     </p:extLst>
   </p:cSld>
@@ -1617,7 +1708,7 @@
     </p:spTree>
     <p:extLst>
       <p:ext uri="{BB962C8B-B14F-4D97-AF65-F5344CB8AC3E}">
-        <p14:creationId xmlns:p14="http://schemas.microsoft.com/office/powerpoint/2010/main" val="3521726753"/>
+        <p14:creationId xmlns:p14="http://schemas.microsoft.com/office/powerpoint/2010/main" val="1413486313"/>
       </p:ext>
     </p:extLst>
   </p:cSld>
@@ -3008,10 +3099,6 @@
               <a:rPr lang="fr-CH" sz="6000" dirty="0" smtClean="0"/>
               <a:t>Projet Android</a:t>
             </a:r>
-            <a:r>
-              <a:rPr lang="fr-CH" sz="6000" dirty="0" smtClean="0"/>
-              <a:t/>
-            </a:r>
             <a:br>
               <a:rPr lang="fr-CH" sz="6000" dirty="0" smtClean="0"/>
             </a:br>
@@ -3053,11 +3140,7 @@
             <a:pPr algn="ctr"/>
             <a:r>
               <a:rPr lang="fr-CH" dirty="0" smtClean="0"/>
-              <a:t>Gsponer </a:t>
-            </a:r>
-            <a:r>
-              <a:rPr lang="fr-CH" dirty="0" smtClean="0"/>
-              <a:t>Émilie</a:t>
+              <a:t>Gsponer Émilie</a:t>
             </a:r>
           </a:p>
           <a:p>
@@ -3066,7 +3149,6 @@
               <a:rPr lang="fr-CH" dirty="0" smtClean="0"/>
               <a:t>Emery Grégory</a:t>
             </a:r>
-            <a:endParaRPr lang="fr-CH" dirty="0" smtClean="0"/>
           </a:p>
         </p:txBody>
       </p:sp>
@@ -3074,6 +3156,193 @@
     <p:extLst>
       <p:ext uri="{BB962C8B-B14F-4D97-AF65-F5344CB8AC3E}">
         <p14:creationId xmlns:p14="http://schemas.microsoft.com/office/powerpoint/2010/main" val="3403401346"/>
+      </p:ext>
+    </p:extLst>
+  </p:cSld>
+  <p:clrMapOvr>
+    <a:masterClrMapping/>
+  </p:clrMapOvr>
+</p:sld>
+</file>
+
+<file path=ppt/slides/slide10.xml><?xml version="1.0" encoding="utf-8"?>
+<p:sld xmlns:a="http://schemas.openxmlformats.org/drawingml/2006/main" xmlns:r="http://schemas.openxmlformats.org/officeDocument/2006/relationships" xmlns:p="http://schemas.openxmlformats.org/presentationml/2006/main">
+  <p:cSld>
+    <p:spTree>
+      <p:nvGrpSpPr>
+        <p:cNvPr id="1" name=""/>
+        <p:cNvGrpSpPr/>
+        <p:nvPr/>
+      </p:nvGrpSpPr>
+      <p:grpSpPr>
+        <a:xfrm>
+          <a:off x="0" y="0"/>
+          <a:ext cx="0" cy="0"/>
+          <a:chOff x="0" y="0"/>
+          <a:chExt cx="0" cy="0"/>
+        </a:xfrm>
+      </p:grpSpPr>
+      <p:sp>
+        <p:nvSpPr>
+          <p:cNvPr id="2" name="Titre 1"/>
+          <p:cNvSpPr>
+            <a:spLocks noGrp="1"/>
+          </p:cNvSpPr>
+          <p:nvPr>
+            <p:ph type="title"/>
+          </p:nvPr>
+        </p:nvSpPr>
+        <p:spPr/>
+        <p:txBody>
+          <a:bodyPr/>
+          <a:lstStyle/>
+          <a:p>
+            <a:r>
+              <a:rPr lang="fr-CH" dirty="0" smtClean="0"/>
+              <a:t>Conclusion</a:t>
+            </a:r>
+            <a:endParaRPr lang="fr-CH" dirty="0"/>
+          </a:p>
+        </p:txBody>
+      </p:sp>
+      <p:sp>
+        <p:nvSpPr>
+          <p:cNvPr id="3" name="Espace réservé du contenu 2"/>
+          <p:cNvSpPr>
+            <a:spLocks noGrp="1"/>
+          </p:cNvSpPr>
+          <p:nvPr>
+            <p:ph idx="1"/>
+          </p:nvPr>
+        </p:nvSpPr>
+        <p:spPr/>
+        <p:txBody>
+          <a:bodyPr/>
+          <a:lstStyle/>
+          <a:p>
+            <a:pPr>
+              <a:lnSpc>
+                <a:spcPct val="200000"/>
+              </a:lnSpc>
+            </a:pPr>
+            <a:r>
+              <a:rPr lang="fr-CH" dirty="0" smtClean="0"/>
+              <a:t>Application fonctionnelle</a:t>
+            </a:r>
+          </a:p>
+          <a:p>
+            <a:pPr>
+              <a:lnSpc>
+                <a:spcPct val="200000"/>
+              </a:lnSpc>
+            </a:pPr>
+            <a:r>
+              <a:rPr lang="fr-CH" dirty="0" smtClean="0"/>
+              <a:t>Simple d’utilisation</a:t>
+            </a:r>
+          </a:p>
+          <a:p>
+            <a:pPr>
+              <a:lnSpc>
+                <a:spcPct val="200000"/>
+              </a:lnSpc>
+            </a:pPr>
+            <a:r>
+              <a:rPr lang="fr-CH" dirty="0" smtClean="0"/>
+              <a:t>Objectifs atteints</a:t>
+            </a:r>
+          </a:p>
+        </p:txBody>
+      </p:sp>
+      <p:sp>
+        <p:nvSpPr>
+          <p:cNvPr id="4" name="Espace réservé de la date 3"/>
+          <p:cNvSpPr>
+            <a:spLocks noGrp="1"/>
+          </p:cNvSpPr>
+          <p:nvPr>
+            <p:ph type="dt" sz="half" idx="10"/>
+          </p:nvPr>
+        </p:nvSpPr>
+        <p:spPr/>
+        <p:txBody>
+          <a:bodyPr/>
+          <a:lstStyle/>
+          <a:p>
+            <a:pPr>
+              <a:defRPr/>
+            </a:pPr>
+            <a:fld id="{EA1CABC2-E43D-4A2A-96AA-B905AFA3A477}" type="datetime1">
+              <a:rPr lang="fr-FR" smtClean="0"/>
+              <a:t>29/12/2015</a:t>
+            </a:fld>
+            <a:endParaRPr lang="fr-CH" dirty="0"/>
+          </a:p>
+        </p:txBody>
+      </p:sp>
+      <p:sp>
+        <p:nvSpPr>
+          <p:cNvPr id="5" name="Espace réservé du pied de page 4"/>
+          <p:cNvSpPr>
+            <a:spLocks noGrp="1"/>
+          </p:cNvSpPr>
+          <p:nvPr>
+            <p:ph type="ftr" sz="quarter" idx="11"/>
+          </p:nvPr>
+        </p:nvSpPr>
+        <p:spPr/>
+        <p:txBody>
+          <a:bodyPr/>
+          <a:lstStyle/>
+          <a:p>
+            <a:pPr>
+              <a:defRPr/>
+            </a:pPr>
+            <a:r>
+              <a:rPr lang="fr-CH" dirty="0"/>
+              <a:t>Projet de semestre : Plateforme </a:t>
+            </a:r>
+            <a:r>
+              <a:rPr lang="fr-CH" dirty="0" err="1"/>
+              <a:t>multisensors</a:t>
+            </a:r>
+            <a:endParaRPr lang="fr-CH" dirty="0"/>
+          </a:p>
+        </p:txBody>
+      </p:sp>
+      <p:sp>
+        <p:nvSpPr>
+          <p:cNvPr id="6" name="Espace réservé du numéro de diapositive 5"/>
+          <p:cNvSpPr>
+            <a:spLocks noGrp="1"/>
+          </p:cNvSpPr>
+          <p:nvPr>
+            <p:ph type="sldNum" sz="quarter" idx="12"/>
+          </p:nvPr>
+        </p:nvSpPr>
+        <p:spPr/>
+        <p:txBody>
+          <a:bodyPr/>
+          <a:lstStyle/>
+          <a:p>
+            <a:pPr>
+              <a:defRPr/>
+            </a:pPr>
+            <a:fld id="{32CEC1FB-FFEB-409B-A724-8424FA35A765}" type="slidenum">
+              <a:rPr lang="fr-CH" smtClean="0"/>
+              <a:pPr>
+                <a:defRPr/>
+              </a:pPr>
+              <a:t>10</a:t>
+            </a:fld>
+            <a:endParaRPr lang="fr-CH" dirty="0"/>
+          </a:p>
+        </p:txBody>
+      </p:sp>
+    </p:spTree>
+    <p:extLst>
+      <p:ext uri="{BB962C8B-B14F-4D97-AF65-F5344CB8AC3E}">
+        <p14:creationId xmlns:p14="http://schemas.microsoft.com/office/powerpoint/2010/main" val="3837468060"/>
       </p:ext>
     </p:extLst>
   </p:cSld>
@@ -3687,7 +3956,11 @@
           <a:p>
             <a:r>
               <a:rPr lang="fr-CH" dirty="0" smtClean="0"/>
-              <a:t>Sauvegarde des résultats</a:t>
+              <a:t>Développement sur l’</a:t>
+            </a:r>
+            <a:r>
+              <a:rPr lang="fr-CH" dirty="0" err="1" smtClean="0"/>
+              <a:t>Arduino</a:t>
             </a:r>
             <a:endParaRPr lang="fr-CH" dirty="0"/>
           </a:p>
@@ -3769,6 +4042,198 @@
                 <a:defRPr/>
               </a:pPr>
               <a:t>5</a:t>
+            </a:fld>
+            <a:endParaRPr lang="fr-CH" dirty="0"/>
+          </a:p>
+        </p:txBody>
+      </p:sp>
+      <p:sp>
+        <p:nvSpPr>
+          <p:cNvPr id="12" name="Espace réservé du contenu 11"/>
+          <p:cNvSpPr>
+            <a:spLocks noGrp="1"/>
+          </p:cNvSpPr>
+          <p:nvPr>
+            <p:ph idx="1"/>
+          </p:nvPr>
+        </p:nvSpPr>
+        <p:spPr/>
+        <p:txBody>
+          <a:bodyPr/>
+          <a:lstStyle/>
+          <a:p>
+            <a:pPr>
+              <a:lnSpc>
+                <a:spcPct val="200000"/>
+              </a:lnSpc>
+            </a:pPr>
+            <a:r>
+              <a:rPr lang="fr-FR" dirty="0" smtClean="0"/>
+              <a:t>Environnement de développement…</a:t>
+            </a:r>
+          </a:p>
+          <a:p>
+            <a:pPr>
+              <a:lnSpc>
+                <a:spcPct val="200000"/>
+              </a:lnSpc>
+            </a:pPr>
+            <a:r>
+              <a:rPr lang="fr-FR" dirty="0" smtClean="0"/>
+              <a:t>Modifications ….</a:t>
+            </a:r>
+          </a:p>
+          <a:p>
+            <a:pPr>
+              <a:lnSpc>
+                <a:spcPct val="200000"/>
+              </a:lnSpc>
+            </a:pPr>
+            <a:r>
+              <a:rPr lang="fr-FR" dirty="0" smtClean="0"/>
+              <a:t>Commandes acceptées…</a:t>
+            </a:r>
+            <a:endParaRPr lang="fr-FR" dirty="0" smtClean="0"/>
+          </a:p>
+          <a:p>
+            <a:pPr lvl="1">
+              <a:lnSpc>
+                <a:spcPct val="200000"/>
+              </a:lnSpc>
+            </a:pPr>
+            <a:endParaRPr lang="fr-FR" dirty="0"/>
+          </a:p>
+        </p:txBody>
+      </p:sp>
+    </p:spTree>
+    <p:extLst>
+      <p:ext uri="{BB962C8B-B14F-4D97-AF65-F5344CB8AC3E}">
+        <p14:creationId xmlns:p14="http://schemas.microsoft.com/office/powerpoint/2010/main" val="2595621718"/>
+      </p:ext>
+    </p:extLst>
+  </p:cSld>
+  <p:clrMapOvr>
+    <a:masterClrMapping/>
+  </p:clrMapOvr>
+</p:sld>
+</file>
+
+<file path=ppt/slides/slide6.xml><?xml version="1.0" encoding="utf-8"?>
+<p:sld xmlns:a="http://schemas.openxmlformats.org/drawingml/2006/main" xmlns:r="http://schemas.openxmlformats.org/officeDocument/2006/relationships" xmlns:p="http://schemas.openxmlformats.org/presentationml/2006/main">
+  <p:cSld>
+    <p:spTree>
+      <p:nvGrpSpPr>
+        <p:cNvPr id="1" name=""/>
+        <p:cNvGrpSpPr/>
+        <p:nvPr/>
+      </p:nvGrpSpPr>
+      <p:grpSpPr>
+        <a:xfrm>
+          <a:off x="0" y="0"/>
+          <a:ext cx="0" cy="0"/>
+          <a:chOff x="0" y="0"/>
+          <a:chExt cx="0" cy="0"/>
+        </a:xfrm>
+      </p:grpSpPr>
+      <p:sp>
+        <p:nvSpPr>
+          <p:cNvPr id="2" name="Titre 1"/>
+          <p:cNvSpPr>
+            <a:spLocks noGrp="1"/>
+          </p:cNvSpPr>
+          <p:nvPr>
+            <p:ph type="title"/>
+          </p:nvPr>
+        </p:nvSpPr>
+        <p:spPr/>
+        <p:txBody>
+          <a:bodyPr/>
+          <a:lstStyle/>
+          <a:p>
+            <a:r>
+              <a:rPr lang="fr-CH" dirty="0" smtClean="0"/>
+              <a:t>Sauvegarde des résultats</a:t>
+            </a:r>
+            <a:endParaRPr lang="fr-CH" dirty="0"/>
+          </a:p>
+        </p:txBody>
+      </p:sp>
+      <p:sp>
+        <p:nvSpPr>
+          <p:cNvPr id="4" name="Espace réservé de la date 3"/>
+          <p:cNvSpPr>
+            <a:spLocks noGrp="1"/>
+          </p:cNvSpPr>
+          <p:nvPr>
+            <p:ph type="dt" sz="half" idx="10"/>
+          </p:nvPr>
+        </p:nvSpPr>
+        <p:spPr/>
+        <p:txBody>
+          <a:bodyPr/>
+          <a:lstStyle/>
+          <a:p>
+            <a:pPr>
+              <a:defRPr/>
+            </a:pPr>
+            <a:fld id="{832D1640-59AB-41DC-BF7F-3D6B47F7681E}" type="datetime1">
+              <a:rPr lang="fr-FR" smtClean="0"/>
+              <a:t>29/12/2015</a:t>
+            </a:fld>
+            <a:endParaRPr lang="fr-CH" dirty="0"/>
+          </a:p>
+        </p:txBody>
+      </p:sp>
+      <p:sp>
+        <p:nvSpPr>
+          <p:cNvPr id="5" name="Espace réservé du pied de page 4"/>
+          <p:cNvSpPr>
+            <a:spLocks noGrp="1"/>
+          </p:cNvSpPr>
+          <p:nvPr>
+            <p:ph type="ftr" sz="quarter" idx="11"/>
+          </p:nvPr>
+        </p:nvSpPr>
+        <p:spPr/>
+        <p:txBody>
+          <a:bodyPr/>
+          <a:lstStyle/>
+          <a:p>
+            <a:pPr>
+              <a:defRPr/>
+            </a:pPr>
+            <a:r>
+              <a:rPr lang="fr-CH" dirty="0" smtClean="0"/>
+              <a:t>Projet Android : Sound distance</a:t>
+            </a:r>
+            <a:endParaRPr lang="fr-CH" dirty="0"/>
+          </a:p>
+        </p:txBody>
+      </p:sp>
+      <p:sp>
+        <p:nvSpPr>
+          <p:cNvPr id="6" name="Espace réservé du numéro de diapositive 5"/>
+          <p:cNvSpPr>
+            <a:spLocks noGrp="1"/>
+          </p:cNvSpPr>
+          <p:nvPr>
+            <p:ph type="sldNum" sz="quarter" idx="12"/>
+          </p:nvPr>
+        </p:nvSpPr>
+        <p:spPr/>
+        <p:txBody>
+          <a:bodyPr/>
+          <a:lstStyle/>
+          <a:p>
+            <a:pPr>
+              <a:defRPr/>
+            </a:pPr>
+            <a:fld id="{32CEC1FB-FFEB-409B-A724-8424FA35A765}" type="slidenum">
+              <a:rPr lang="fr-CH" smtClean="0"/>
+              <a:pPr>
+                <a:defRPr/>
+              </a:pPr>
+              <a:t>6</a:t>
             </a:fld>
             <a:endParaRPr lang="fr-CH" dirty="0"/>
           </a:p>
@@ -3968,7 +4433,7 @@
 </p:sld>
 </file>
 
-<file path=ppt/slides/slide6.xml><?xml version="1.0" encoding="utf-8"?>
+<file path=ppt/slides/slide7.xml><?xml version="1.0" encoding="utf-8"?>
 <p:sld xmlns:a="http://schemas.openxmlformats.org/drawingml/2006/main" xmlns:r="http://schemas.openxmlformats.org/officeDocument/2006/relationships" xmlns:p="http://schemas.openxmlformats.org/presentationml/2006/main">
   <p:cSld>
     <p:spTree>
@@ -4083,7 +4548,7 @@
               <a:pPr>
                 <a:defRPr/>
               </a:pPr>
-              <a:t>6</a:t>
+              <a:t>7</a:t>
             </a:fld>
             <a:endParaRPr lang="fr-CH" dirty="0"/>
           </a:p>
@@ -4177,172 +4642,6 @@
 </p:sld>
 </file>
 
-<file path=ppt/slides/slide7.xml><?xml version="1.0" encoding="utf-8"?>
-<p:sld xmlns:a="http://schemas.openxmlformats.org/drawingml/2006/main" xmlns:r="http://schemas.openxmlformats.org/officeDocument/2006/relationships" xmlns:p="http://schemas.openxmlformats.org/presentationml/2006/main">
-  <p:cSld>
-    <p:spTree>
-      <p:nvGrpSpPr>
-        <p:cNvPr id="1" name=""/>
-        <p:cNvGrpSpPr/>
-        <p:nvPr/>
-      </p:nvGrpSpPr>
-      <p:grpSpPr>
-        <a:xfrm>
-          <a:off x="0" y="0"/>
-          <a:ext cx="0" cy="0"/>
-          <a:chOff x="0" y="0"/>
-          <a:chExt cx="0" cy="0"/>
-        </a:xfrm>
-      </p:grpSpPr>
-      <p:sp>
-        <p:nvSpPr>
-          <p:cNvPr id="2" name="Titre 1"/>
-          <p:cNvSpPr>
-            <a:spLocks noGrp="1"/>
-          </p:cNvSpPr>
-          <p:nvPr>
-            <p:ph type="title"/>
-          </p:nvPr>
-        </p:nvSpPr>
-        <p:spPr/>
-        <p:txBody>
-          <a:bodyPr/>
-          <a:lstStyle/>
-          <a:p>
-            <a:r>
-              <a:rPr lang="fr-CH" dirty="0" smtClean="0"/>
-              <a:t>Démo</a:t>
-            </a:r>
-            <a:endParaRPr lang="fr-CH" dirty="0"/>
-          </a:p>
-        </p:txBody>
-      </p:sp>
-      <p:sp>
-        <p:nvSpPr>
-          <p:cNvPr id="4" name="Espace réservé de la date 3"/>
-          <p:cNvSpPr>
-            <a:spLocks noGrp="1"/>
-          </p:cNvSpPr>
-          <p:nvPr>
-            <p:ph type="dt" sz="half" idx="10"/>
-          </p:nvPr>
-        </p:nvSpPr>
-        <p:spPr/>
-        <p:txBody>
-          <a:bodyPr/>
-          <a:lstStyle/>
-          <a:p>
-            <a:pPr>
-              <a:defRPr/>
-            </a:pPr>
-            <a:fld id="{832D1640-59AB-41DC-BF7F-3D6B47F7681E}" type="datetime1">
-              <a:rPr lang="fr-FR" smtClean="0"/>
-              <a:t>29/12/2015</a:t>
-            </a:fld>
-            <a:endParaRPr lang="fr-CH" dirty="0"/>
-          </a:p>
-        </p:txBody>
-      </p:sp>
-      <p:sp>
-        <p:nvSpPr>
-          <p:cNvPr id="5" name="Espace réservé du pied de page 4"/>
-          <p:cNvSpPr>
-            <a:spLocks noGrp="1"/>
-          </p:cNvSpPr>
-          <p:nvPr>
-            <p:ph type="ftr" sz="quarter" idx="11"/>
-          </p:nvPr>
-        </p:nvSpPr>
-        <p:spPr/>
-        <p:txBody>
-          <a:bodyPr/>
-          <a:lstStyle/>
-          <a:p>
-            <a:pPr>
-              <a:defRPr/>
-            </a:pPr>
-            <a:r>
-              <a:rPr lang="fr-CH" dirty="0" smtClean="0"/>
-              <a:t>Projet Android : Sound distance</a:t>
-            </a:r>
-            <a:endParaRPr lang="fr-CH" dirty="0"/>
-          </a:p>
-        </p:txBody>
-      </p:sp>
-      <p:sp>
-        <p:nvSpPr>
-          <p:cNvPr id="6" name="Espace réservé du numéro de diapositive 5"/>
-          <p:cNvSpPr>
-            <a:spLocks noGrp="1"/>
-          </p:cNvSpPr>
-          <p:nvPr>
-            <p:ph type="sldNum" sz="quarter" idx="12"/>
-          </p:nvPr>
-        </p:nvSpPr>
-        <p:spPr/>
-        <p:txBody>
-          <a:bodyPr/>
-          <a:lstStyle/>
-          <a:p>
-            <a:pPr>
-              <a:defRPr/>
-            </a:pPr>
-            <a:fld id="{32CEC1FB-FFEB-409B-A724-8424FA35A765}" type="slidenum">
-              <a:rPr lang="fr-CH" smtClean="0"/>
-              <a:pPr>
-                <a:defRPr/>
-              </a:pPr>
-              <a:t>7</a:t>
-            </a:fld>
-            <a:endParaRPr lang="fr-CH" dirty="0"/>
-          </a:p>
-        </p:txBody>
-      </p:sp>
-      <p:sp>
-        <p:nvSpPr>
-          <p:cNvPr id="12" name="Espace réservé du contenu 11"/>
-          <p:cNvSpPr>
-            <a:spLocks noGrp="1"/>
-          </p:cNvSpPr>
-          <p:nvPr>
-            <p:ph idx="1"/>
-          </p:nvPr>
-        </p:nvSpPr>
-        <p:spPr/>
-        <p:txBody>
-          <a:bodyPr/>
-          <a:lstStyle/>
-          <a:p>
-            <a:pPr lvl="0"/>
-            <a:endParaRPr lang="fr-FR" dirty="0"/>
-          </a:p>
-          <a:p>
-            <a:pPr lvl="0"/>
-            <a:r>
-              <a:rPr lang="fr-FR" dirty="0" err="1" smtClean="0"/>
-              <a:t>Add</a:t>
-            </a:r>
-            <a:r>
-              <a:rPr lang="fr-FR" dirty="0" smtClean="0"/>
-              <a:t> vidéo….</a:t>
-            </a:r>
-            <a:endParaRPr lang="fr-FR" dirty="0"/>
-          </a:p>
-        </p:txBody>
-      </p:sp>
-    </p:spTree>
-    <p:extLst>
-      <p:ext uri="{BB962C8B-B14F-4D97-AF65-F5344CB8AC3E}">
-        <p14:creationId xmlns:p14="http://schemas.microsoft.com/office/powerpoint/2010/main" val="2894144361"/>
-      </p:ext>
-    </p:extLst>
-  </p:cSld>
-  <p:clrMapOvr>
-    <a:masterClrMapping/>
-  </p:clrMapOvr>
-</p:sld>
-</file>
-
 <file path=ppt/slides/slide8.xml><?xml version="1.0" encoding="utf-8"?>
 <p:sld xmlns:a="http://schemas.openxmlformats.org/drawingml/2006/main" xmlns:r="http://schemas.openxmlformats.org/officeDocument/2006/relationships" xmlns:p="http://schemas.openxmlformats.org/presentationml/2006/main">
   <p:cSld>
@@ -4377,7 +4676,7 @@
           <a:p>
             <a:r>
               <a:rPr lang="fr-CH" dirty="0" smtClean="0"/>
-              <a:t>Possibilités d’amélioration</a:t>
+              <a:t>Démo</a:t>
             </a:r>
             <a:endParaRPr lang="fr-CH" dirty="0"/>
           </a:p>
@@ -4479,25 +4778,18 @@
           <a:bodyPr/>
           <a:lstStyle/>
           <a:p>
-            <a:pPr>
-              <a:lnSpc>
-                <a:spcPct val="200000"/>
-              </a:lnSpc>
-            </a:pPr>
+            <a:pPr lvl="0"/>
+            <a:endParaRPr lang="fr-FR" dirty="0"/>
+          </a:p>
+          <a:p>
+            <a:pPr lvl="0"/>
+            <a:r>
+              <a:rPr lang="fr-FR" dirty="0" err="1" smtClean="0"/>
+              <a:t>Add</a:t>
+            </a:r>
             <a:r>
               <a:rPr lang="fr-FR" dirty="0" smtClean="0"/>
-              <a:t>Stockage des mesures dans une base de donnée</a:t>
-            </a:r>
-          </a:p>
-          <a:p>
-            <a:pPr lvl="0">
-              <a:lnSpc>
-                <a:spcPct val="200000"/>
-              </a:lnSpc>
-            </a:pPr>
-            <a:r>
-              <a:rPr lang="fr-FR" dirty="0" smtClean="0"/>
-              <a:t>Module de mesure de plus grande précision</a:t>
+              <a:t> vidéo….</a:t>
             </a:r>
             <a:endParaRPr lang="fr-FR" dirty="0"/>
           </a:p>
@@ -4506,7 +4798,7 @@
     </p:spTree>
     <p:extLst>
       <p:ext uri="{BB962C8B-B14F-4D97-AF65-F5344CB8AC3E}">
-        <p14:creationId xmlns:p14="http://schemas.microsoft.com/office/powerpoint/2010/main" val="3898967226"/>
+        <p14:creationId xmlns:p14="http://schemas.microsoft.com/office/powerpoint/2010/main" val="2894144361"/>
       </p:ext>
     </p:extLst>
   </p:cSld>
@@ -4550,7 +4842,7 @@
           <a:p>
             <a:r>
               <a:rPr lang="fr-CH" dirty="0" smtClean="0"/>
-              <a:t>Conclusion</a:t>
+              <a:t>Possibilités d’amélioration</a:t>
             </a:r>
             <a:endParaRPr lang="fr-CH" dirty="0"/>
           </a:p>
@@ -4558,56 +4850,6 @@
       </p:sp>
       <p:sp>
         <p:nvSpPr>
-          <p:cNvPr id="3" name="Espace réservé du contenu 2"/>
-          <p:cNvSpPr>
-            <a:spLocks noGrp="1"/>
-          </p:cNvSpPr>
-          <p:nvPr>
-            <p:ph idx="1"/>
-          </p:nvPr>
-        </p:nvSpPr>
-        <p:spPr/>
-        <p:txBody>
-          <a:bodyPr/>
-          <a:lstStyle/>
-          <a:p>
-            <a:pPr>
-              <a:lnSpc>
-                <a:spcPct val="200000"/>
-              </a:lnSpc>
-            </a:pPr>
-            <a:r>
-              <a:rPr lang="fr-CH" dirty="0" smtClean="0"/>
-              <a:t>Application fonctionnelle</a:t>
-            </a:r>
-          </a:p>
-          <a:p>
-            <a:pPr>
-              <a:lnSpc>
-                <a:spcPct val="200000"/>
-              </a:lnSpc>
-            </a:pPr>
-            <a:r>
-              <a:rPr lang="fr-CH" dirty="0" smtClean="0"/>
-              <a:t>Simple d’utilisation</a:t>
-            </a:r>
-          </a:p>
-          <a:p>
-            <a:pPr>
-              <a:lnSpc>
-                <a:spcPct val="200000"/>
-              </a:lnSpc>
-            </a:pPr>
-            <a:r>
-              <a:rPr lang="fr-CH" dirty="0" smtClean="0"/>
-              <a:t>Objectifs atteints</a:t>
-            </a:r>
-            <a:endParaRPr lang="fr-CH" dirty="0" smtClean="0"/>
-          </a:p>
-        </p:txBody>
-      </p:sp>
-      <p:sp>
-        <p:nvSpPr>
           <p:cNvPr id="4" name="Espace réservé de la date 3"/>
           <p:cNvSpPr>
             <a:spLocks noGrp="1"/>
@@ -4624,7 +4866,7 @@
             <a:pPr>
               <a:defRPr/>
             </a:pPr>
-            <a:fld id="{EA1CABC2-E43D-4A2A-96AA-B905AFA3A477}" type="datetime1">
+            <a:fld id="{832D1640-59AB-41DC-BF7F-3D6B47F7681E}" type="datetime1">
               <a:rPr lang="fr-FR" smtClean="0"/>
               <a:t>29/12/2015</a:t>
             </a:fld>
@@ -4651,12 +4893,8 @@
               <a:defRPr/>
             </a:pPr>
             <a:r>
-              <a:rPr lang="fr-CH" dirty="0"/>
-              <a:t>Projet de semestre : Plateforme </a:t>
-            </a:r>
-            <a:r>
-              <a:rPr lang="fr-CH" dirty="0" err="1"/>
-              <a:t>multisensors</a:t>
+              <a:rPr lang="fr-CH" dirty="0" smtClean="0"/>
+              <a:t>Projet Android : Sound distance</a:t>
             </a:r>
             <a:endParaRPr lang="fr-CH" dirty="0"/>
           </a:p>
@@ -4691,10 +4929,49 @@
           </a:p>
         </p:txBody>
       </p:sp>
+      <p:sp>
+        <p:nvSpPr>
+          <p:cNvPr id="12" name="Espace réservé du contenu 11"/>
+          <p:cNvSpPr>
+            <a:spLocks noGrp="1"/>
+          </p:cNvSpPr>
+          <p:nvPr>
+            <p:ph idx="1"/>
+          </p:nvPr>
+        </p:nvSpPr>
+        <p:spPr/>
+        <p:txBody>
+          <a:bodyPr/>
+          <a:lstStyle/>
+          <a:p>
+            <a:pPr>
+              <a:lnSpc>
+                <a:spcPct val="200000"/>
+              </a:lnSpc>
+            </a:pPr>
+            <a:r>
+              <a:rPr lang="fr-FR" dirty="0" smtClean="0"/>
+              <a:t>Stockage des mesures dans une base de donnée</a:t>
+            </a:r>
+          </a:p>
+          <a:p>
+            <a:pPr lvl="0">
+              <a:lnSpc>
+                <a:spcPct val="200000"/>
+              </a:lnSpc>
+            </a:pPr>
+            <a:r>
+              <a:rPr lang="fr-FR" dirty="0" smtClean="0"/>
+              <a:t>Module de mesure de plus grande précision</a:t>
+            </a:r>
+            <a:endParaRPr lang="fr-FR" dirty="0"/>
+          </a:p>
+        </p:txBody>
+      </p:sp>
     </p:spTree>
     <p:extLst>
       <p:ext uri="{BB962C8B-B14F-4D97-AF65-F5344CB8AC3E}">
-        <p14:creationId xmlns:p14="http://schemas.microsoft.com/office/powerpoint/2010/main" val="3837468060"/>
+        <p14:creationId xmlns:p14="http://schemas.microsoft.com/office/powerpoint/2010/main" val="3898967226"/>
       </p:ext>
     </p:extLst>
   </p:cSld>

</xml_diff>